<commit_message>
20171113 lec CTC added
</commit_message>
<xml_diff>
--- a/slides/rnn_architecture_2017통신.pptx
+++ b/slides/rnn_architecture_2017통신.pptx
@@ -6541,748 +6541,1158 @@
           </p:sp>
         </mc:Fallback>
       </mc:AlternateContent>
-      <p:pic>
-        <p:nvPicPr>
-          <p:cNvPr id="2050" name="Picture 2" descr="https://camo.githubusercontent.com/c268235b0e17fc3988fbcbf924f12dc64b5020a7/687474703a2f2f692e696d6775722e636f6d2f596359783369622e706e67"/>
-          <p:cNvPicPr>
-            <a:picLocks noChangeAspect="1" noChangeArrowheads="1"/>
-          </p:cNvPicPr>
+      <p:grpSp>
+        <p:nvGrpSpPr>
+          <p:cNvPr id="11" name="그룹 10"/>
+          <p:cNvGrpSpPr/>
           <p:nvPr/>
-        </p:nvPicPr>
-        <p:blipFill>
-          <a:blip r:embed="rId3">
+        </p:nvGrpSpPr>
+        <p:grpSpPr>
+          <a:xfrm>
+            <a:off x="-181422" y="2160407"/>
+            <a:ext cx="9226498" cy="3705225"/>
+            <a:chOff x="-181422" y="2160407"/>
+            <a:chExt cx="9226498" cy="3705225"/>
+          </a:xfrm>
+        </p:grpSpPr>
+        <p:pic>
+          <p:nvPicPr>
+            <p:cNvPr id="2050" name="Picture 2" descr="https://camo.githubusercontent.com/c268235b0e17fc3988fbcbf924f12dc64b5020a7/687474703a2f2f692e696d6775722e636f6d2f596359783369622e706e67"/>
+            <p:cNvPicPr>
+              <a:picLocks noChangeAspect="1" noChangeArrowheads="1"/>
+            </p:cNvPicPr>
+            <p:nvPr/>
+          </p:nvPicPr>
+          <p:blipFill>
+            <a:blip r:embed="rId3">
+              <a:extLst>
+                <a:ext uri="{28A0092B-C50C-407E-A947-70E740481C1C}">
+                  <a14:useLocalDpi xmlns:a14="http://schemas.microsoft.com/office/drawing/2010/main" val="0"/>
+                </a:ext>
+              </a:extLst>
+            </a:blip>
+            <a:srcRect/>
+            <a:stretch>
+              <a:fillRect/>
+            </a:stretch>
+          </p:blipFill>
+          <p:spPr bwMode="auto">
+            <a:xfrm>
+              <a:off x="-181422" y="2160407"/>
+              <a:ext cx="9226498" cy="3705225"/>
+            </a:xfrm>
+            <a:prstGeom prst="rect">
+              <a:avLst/>
+            </a:prstGeom>
+            <a:noFill/>
             <a:extLst>
-              <a:ext uri="{28A0092B-C50C-407E-A947-70E740481C1C}">
-                <a14:useLocalDpi xmlns:a14="http://schemas.microsoft.com/office/drawing/2010/main" val="0"/>
+              <a:ext uri="{909E8E84-426E-40DD-AFC4-6F175D3DCCD1}">
+                <a14:hiddenFill xmlns:a14="http://schemas.microsoft.com/office/drawing/2010/main">
+                  <a:solidFill>
+                    <a:srgbClr val="FFFFFF"/>
+                  </a:solidFill>
+                </a14:hiddenFill>
               </a:ext>
             </a:extLst>
-          </a:blip>
-          <a:srcRect/>
-          <a:stretch>
-            <a:fillRect/>
-          </a:stretch>
-        </p:blipFill>
-        <p:spPr bwMode="auto">
-          <a:xfrm>
-            <a:off x="-181422" y="2152243"/>
-            <a:ext cx="9226498" cy="3705225"/>
-          </a:xfrm>
-          <a:prstGeom prst="rect">
-            <a:avLst/>
-          </a:prstGeom>
-          <a:noFill/>
-          <a:extLst>
-            <a:ext uri="{909E8E84-426E-40DD-AFC4-6F175D3DCCD1}">
-              <a14:hiddenFill xmlns:a14="http://schemas.microsoft.com/office/drawing/2010/main">
+          </p:spPr>
+        </p:pic>
+        <mc:AlternateContent xmlns:mc="http://schemas.openxmlformats.org/markup-compatibility/2006">
+          <mc:Choice xmlns:a14="http://schemas.microsoft.com/office/drawing/2010/main" Requires="a14">
+            <p:sp>
+              <p:nvSpPr>
+                <p:cNvPr id="2" name="직사각형 1"/>
+                <p:cNvSpPr/>
+                <p:nvPr/>
+              </p:nvSpPr>
+              <p:spPr>
+                <a:xfrm>
+                  <a:off x="1691496" y="4130659"/>
+                  <a:ext cx="1631152" cy="545855"/>
+                </a:xfrm>
+                <a:prstGeom prst="rect">
+                  <a:avLst/>
+                </a:prstGeom>
+              </p:spPr>
+              <p:txBody>
+                <a:bodyPr wrap="none">
+                  <a:spAutoFit/>
+                </a:bodyPr>
+                <a:lstStyle/>
+                <a:p>
+                  <a14:m>
+                    <m:oMathPara xmlns:m="http://schemas.openxmlformats.org/officeDocument/2006/math">
+                      <m:oMathParaPr>
+                        <m:jc m:val="centerGroup"/>
+                      </m:oMathParaPr>
+                      <m:oMath xmlns:m="http://schemas.openxmlformats.org/officeDocument/2006/math">
+                        <m:sSubSup>
+                          <m:sSubSupPr>
+                            <m:ctrlPr>
+                              <a:rPr lang="en-US" altLang="ko-KR" sz="1400" i="1" smtClean="0">
+                                <a:ln w="0"/>
+                                <a:solidFill>
+                                  <a:schemeClr val="accent1"/>
+                                </a:solidFill>
+                                <a:effectLst>
+                                  <a:outerShdw blurRad="38100" dist="25400" dir="5400000" algn="ctr" rotWithShape="0">
+                                    <a:srgbClr val="6E747A">
+                                      <a:alpha val="43000"/>
+                                    </a:srgbClr>
+                                  </a:outerShdw>
+                                </a:effectLst>
+                                <a:latin typeface="Cambria Math" panose="02040503050406030204" pitchFamily="18" charset="0"/>
+                              </a:rPr>
+                            </m:ctrlPr>
+                          </m:sSubSupPr>
+                          <m:e>
+                            <m:r>
+                              <a:rPr lang="en-US" altLang="ko-KR" sz="1400" i="1">
+                                <a:ln w="0"/>
+                                <a:solidFill>
+                                  <a:schemeClr val="accent1"/>
+                                </a:solidFill>
+                                <a:effectLst>
+                                  <a:outerShdw blurRad="38100" dist="25400" dir="5400000" algn="ctr" rotWithShape="0">
+                                    <a:srgbClr val="6E747A">
+                                      <a:alpha val="43000"/>
+                                    </a:srgbClr>
+                                  </a:outerShdw>
+                                </a:effectLst>
+                                <a:latin typeface="Cambria Math" panose="02040503050406030204" pitchFamily="18" charset="0"/>
+                              </a:rPr>
+                              <m:t>h</m:t>
+                            </m:r>
+                          </m:e>
+                          <m:sub>
+                            <m:r>
+                              <a:rPr lang="en-US" altLang="ko-KR" sz="1400" i="1">
+                                <a:ln w="0"/>
+                                <a:solidFill>
+                                  <a:schemeClr val="accent1"/>
+                                </a:solidFill>
+                                <a:effectLst>
+                                  <a:outerShdw blurRad="38100" dist="25400" dir="5400000" algn="ctr" rotWithShape="0">
+                                    <a:srgbClr val="6E747A">
+                                      <a:alpha val="43000"/>
+                                    </a:srgbClr>
+                                  </a:outerShdw>
+                                </a:effectLst>
+                                <a:latin typeface="Cambria Math" panose="02040503050406030204" pitchFamily="18" charset="0"/>
+                              </a:rPr>
+                              <m:t>𝑡</m:t>
+                            </m:r>
+                            <m:r>
+                              <a:rPr lang="en-US" altLang="ko-KR" sz="1400" i="1">
+                                <a:ln w="0"/>
+                                <a:solidFill>
+                                  <a:schemeClr val="accent1"/>
+                                </a:solidFill>
+                                <a:effectLst>
+                                  <a:outerShdw blurRad="38100" dist="25400" dir="5400000" algn="ctr" rotWithShape="0">
+                                    <a:srgbClr val="6E747A">
+                                      <a:alpha val="43000"/>
+                                    </a:srgbClr>
+                                  </a:outerShdw>
+                                </a:effectLst>
+                                <a:latin typeface="Cambria Math" panose="02040503050406030204" pitchFamily="18" charset="0"/>
+                              </a:rPr>
+                              <m:t>−1</m:t>
+                            </m:r>
+                          </m:sub>
+                          <m:sup/>
+                        </m:sSubSup>
+                      </m:oMath>
+                    </m:oMathPara>
+                  </a14:m>
+                  <a:endParaRPr lang="en-US" altLang="ko-KR" sz="1400" dirty="0" smtClean="0">
+                    <a:ln w="0"/>
+                    <a:solidFill>
+                      <a:schemeClr val="accent1"/>
+                    </a:solidFill>
+                    <a:effectLst>
+                      <a:outerShdw blurRad="38100" dist="25400" dir="5400000" algn="ctr" rotWithShape="0">
+                        <a:srgbClr val="6E747A">
+                          <a:alpha val="43000"/>
+                        </a:srgbClr>
+                      </a:outerShdw>
+                    </a:effectLst>
+                  </a:endParaRPr>
+                </a:p>
+                <a:p>
+                  <a:r>
+                    <a:rPr lang="en-US" altLang="ko-KR" sz="1400" dirty="0" smtClean="0">
+                      <a:ln w="0"/>
+                      <a:solidFill>
+                        <a:schemeClr val="accent1"/>
+                      </a:solidFill>
+                      <a:effectLst>
+                        <a:outerShdw blurRad="38100" dist="25400" dir="5400000" algn="ctr" rotWithShape="0">
+                          <a:srgbClr val="6E747A">
+                            <a:alpha val="43000"/>
+                          </a:srgbClr>
+                        </a:outerShdw>
+                      </a:effectLst>
+                    </a:rPr>
+                    <a:t>short-term memory</a:t>
+                  </a:r>
+                  <a:endParaRPr lang="ko-KR" altLang="en-US" dirty="0">
+                    <a:ln w="0"/>
+                    <a:solidFill>
+                      <a:schemeClr val="accent1"/>
+                    </a:solidFill>
+                    <a:effectLst>
+                      <a:outerShdw blurRad="38100" dist="25400" dir="5400000" algn="ctr" rotWithShape="0">
+                        <a:srgbClr val="6E747A">
+                          <a:alpha val="43000"/>
+                        </a:srgbClr>
+                      </a:outerShdw>
+                    </a:effectLst>
+                  </a:endParaRPr>
+                </a:p>
+              </p:txBody>
+            </p:sp>
+          </mc:Choice>
+          <mc:Fallback>
+            <p:sp>
+              <p:nvSpPr>
+                <p:cNvPr id="2" name="직사각형 1"/>
+                <p:cNvSpPr>
+                  <a:spLocks noRot="1" noChangeAspect="1" noMove="1" noResize="1" noEditPoints="1" noAdjustHandles="1" noChangeArrowheads="1" noChangeShapeType="1" noTextEdit="1"/>
+                </p:cNvSpPr>
+                <p:nvPr/>
+              </p:nvSpPr>
+              <p:spPr>
+                <a:xfrm>
+                  <a:off x="1691496" y="4130659"/>
+                  <a:ext cx="1631152" cy="545855"/>
+                </a:xfrm>
+                <a:prstGeom prst="rect">
+                  <a:avLst/>
+                </a:prstGeom>
+                <a:blipFill rotWithShape="0">
+                  <a:blip r:embed="rId4"/>
+                  <a:stretch>
+                    <a:fillRect l="-1866" r="-373" b="-15730"/>
+                  </a:stretch>
+                </a:blipFill>
+              </p:spPr>
+              <p:txBody>
+                <a:bodyPr/>
+                <a:lstStyle/>
+                <a:p>
+                  <a:r>
+                    <a:rPr lang="ko-KR" altLang="en-US">
+                      <a:noFill/>
+                    </a:rPr>
+                    <a:t> </a:t>
+                  </a:r>
+                </a:p>
+              </p:txBody>
+            </p:sp>
+          </mc:Fallback>
+        </mc:AlternateContent>
+        <mc:AlternateContent xmlns:mc="http://schemas.openxmlformats.org/markup-compatibility/2006">
+          <mc:Choice xmlns:a14="http://schemas.microsoft.com/office/drawing/2010/main" Requires="a14">
+            <p:sp>
+              <p:nvSpPr>
+                <p:cNvPr id="8" name="직사각형 7"/>
+                <p:cNvSpPr/>
+                <p:nvPr/>
+              </p:nvSpPr>
+              <p:spPr>
+                <a:xfrm>
+                  <a:off x="1749297" y="3070548"/>
+                  <a:ext cx="1563826" cy="523220"/>
+                </a:xfrm>
+                <a:prstGeom prst="rect">
+                  <a:avLst/>
+                </a:prstGeom>
+              </p:spPr>
+              <p:txBody>
+                <a:bodyPr wrap="none">
+                  <a:spAutoFit/>
+                </a:bodyPr>
+                <a:lstStyle/>
+                <a:p>
+                  <a:r>
+                    <a:rPr lang="en-US" altLang="ko-KR" sz="1400" dirty="0" smtClean="0">
+                      <a:ln w="0"/>
+                      <a:solidFill>
+                        <a:schemeClr val="accent1"/>
+                      </a:solidFill>
+                      <a:effectLst>
+                        <a:outerShdw blurRad="38100" dist="25400" dir="5400000" algn="ctr" rotWithShape="0">
+                          <a:srgbClr val="6E747A">
+                            <a:alpha val="43000"/>
+                          </a:srgbClr>
+                        </a:outerShdw>
+                      </a:effectLst>
+                    </a:rPr>
+                    <a:t>long-term memory</a:t>
+                  </a:r>
+                  <a:endParaRPr lang="en-US" altLang="ko-KR" sz="1400" i="1" dirty="0" smtClean="0">
+                    <a:ln w="0"/>
+                    <a:solidFill>
+                      <a:schemeClr val="accent1"/>
+                    </a:solidFill>
+                    <a:effectLst>
+                      <a:outerShdw blurRad="38100" dist="25400" dir="5400000" algn="ctr" rotWithShape="0">
+                        <a:srgbClr val="6E747A">
+                          <a:alpha val="43000"/>
+                        </a:srgbClr>
+                      </a:outerShdw>
+                    </a:effectLst>
+                    <a:latin typeface="Cambria Math" panose="02040503050406030204" pitchFamily="18" charset="0"/>
+                  </a:endParaRPr>
+                </a:p>
+                <a:p>
+                  <a14:m>
+                    <m:oMathPara xmlns:m="http://schemas.openxmlformats.org/officeDocument/2006/math">
+                      <m:oMathParaPr>
+                        <m:jc m:val="centerGroup"/>
+                      </m:oMathParaPr>
+                      <m:oMath xmlns:m="http://schemas.openxmlformats.org/officeDocument/2006/math">
+                        <m:sSub>
+                          <m:sSubPr>
+                            <m:ctrlPr>
+                              <a:rPr lang="en-US" altLang="ko-KR" sz="1400" i="1">
+                                <a:ln w="0"/>
+                                <a:solidFill>
+                                  <a:schemeClr val="accent1"/>
+                                </a:solidFill>
+                                <a:effectLst>
+                                  <a:outerShdw blurRad="38100" dist="25400" dir="5400000" algn="ctr" rotWithShape="0">
+                                    <a:srgbClr val="6E747A">
+                                      <a:alpha val="43000"/>
+                                    </a:srgbClr>
+                                  </a:outerShdw>
+                                </a:effectLst>
+                                <a:latin typeface="Cambria Math" panose="02040503050406030204" pitchFamily="18" charset="0"/>
+                              </a:rPr>
+                            </m:ctrlPr>
+                          </m:sSubPr>
+                          <m:e>
+                            <m:r>
+                              <a:rPr lang="en-US" altLang="ko-KR" sz="1400" i="1">
+                                <a:ln w="0"/>
+                                <a:solidFill>
+                                  <a:schemeClr val="accent1"/>
+                                </a:solidFill>
+                                <a:effectLst>
+                                  <a:outerShdw blurRad="38100" dist="25400" dir="5400000" algn="ctr" rotWithShape="0">
+                                    <a:srgbClr val="6E747A">
+                                      <a:alpha val="43000"/>
+                                    </a:srgbClr>
+                                  </a:outerShdw>
+                                </a:effectLst>
+                                <a:latin typeface="Cambria Math" panose="02040503050406030204" pitchFamily="18" charset="0"/>
+                              </a:rPr>
+                              <m:t>𝑐</m:t>
+                            </m:r>
+                          </m:e>
+                          <m:sub>
+                            <m:r>
+                              <a:rPr lang="en-US" altLang="ko-KR" sz="1400" i="1">
+                                <a:ln w="0"/>
+                                <a:solidFill>
+                                  <a:schemeClr val="accent1"/>
+                                </a:solidFill>
+                                <a:effectLst>
+                                  <a:outerShdw blurRad="38100" dist="25400" dir="5400000" algn="ctr" rotWithShape="0">
+                                    <a:srgbClr val="6E747A">
+                                      <a:alpha val="43000"/>
+                                    </a:srgbClr>
+                                  </a:outerShdw>
+                                </a:effectLst>
+                                <a:latin typeface="Cambria Math" panose="02040503050406030204" pitchFamily="18" charset="0"/>
+                              </a:rPr>
+                              <m:t>𝑡</m:t>
+                            </m:r>
+                            <m:r>
+                              <a:rPr lang="en-US" altLang="ko-KR" sz="1400" i="1">
+                                <a:ln w="0"/>
+                                <a:solidFill>
+                                  <a:schemeClr val="accent1"/>
+                                </a:solidFill>
+                                <a:effectLst>
+                                  <a:outerShdw blurRad="38100" dist="25400" dir="5400000" algn="ctr" rotWithShape="0">
+                                    <a:srgbClr val="6E747A">
+                                      <a:alpha val="43000"/>
+                                    </a:srgbClr>
+                                  </a:outerShdw>
+                                </a:effectLst>
+                                <a:latin typeface="Cambria Math" panose="02040503050406030204" pitchFamily="18" charset="0"/>
+                              </a:rPr>
+                              <m:t>−1</m:t>
+                            </m:r>
+                          </m:sub>
+                        </m:sSub>
+                      </m:oMath>
+                    </m:oMathPara>
+                  </a14:m>
+                  <a:endParaRPr lang="en-US" altLang="ko-KR" sz="1400" dirty="0" smtClean="0">
+                    <a:ln w="0"/>
+                    <a:solidFill>
+                      <a:schemeClr val="accent1"/>
+                    </a:solidFill>
+                    <a:effectLst>
+                      <a:outerShdw blurRad="38100" dist="25400" dir="5400000" algn="ctr" rotWithShape="0">
+                        <a:srgbClr val="6E747A">
+                          <a:alpha val="43000"/>
+                        </a:srgbClr>
+                      </a:outerShdw>
+                    </a:effectLst>
+                  </a:endParaRPr>
+                </a:p>
+              </p:txBody>
+            </p:sp>
+          </mc:Choice>
+          <mc:Fallback>
+            <p:sp>
+              <p:nvSpPr>
+                <p:cNvPr id="8" name="직사각형 7"/>
+                <p:cNvSpPr>
+                  <a:spLocks noRot="1" noChangeAspect="1" noMove="1" noResize="1" noEditPoints="1" noAdjustHandles="1" noChangeArrowheads="1" noChangeShapeType="1" noTextEdit="1"/>
+                </p:cNvSpPr>
+                <p:nvPr/>
+              </p:nvSpPr>
+              <p:spPr>
+                <a:xfrm>
+                  <a:off x="1749297" y="3070548"/>
+                  <a:ext cx="1563826" cy="523220"/>
+                </a:xfrm>
+                <a:prstGeom prst="rect">
+                  <a:avLst/>
+                </a:prstGeom>
+                <a:blipFill rotWithShape="0">
+                  <a:blip r:embed="rId5"/>
+                  <a:stretch>
+                    <a:fillRect l="-1953" t="-2326" r="-391"/>
+                  </a:stretch>
+                </a:blipFill>
+              </p:spPr>
+              <p:txBody>
+                <a:bodyPr/>
+                <a:lstStyle/>
+                <a:p>
+                  <a:r>
+                    <a:rPr lang="ko-KR" altLang="en-US">
+                      <a:noFill/>
+                    </a:rPr>
+                    <a:t> </a:t>
+                  </a:r>
+                </a:p>
+              </p:txBody>
+            </p:sp>
+          </mc:Fallback>
+        </mc:AlternateContent>
+        <mc:AlternateContent xmlns:mc="http://schemas.openxmlformats.org/markup-compatibility/2006">
+          <mc:Choice xmlns:a14="http://schemas.microsoft.com/office/drawing/2010/main" Requires="a14">
+            <p:sp>
+              <p:nvSpPr>
+                <p:cNvPr id="3" name="직사각형 2"/>
+                <p:cNvSpPr/>
+                <p:nvPr/>
+              </p:nvSpPr>
+              <p:spPr>
+                <a:xfrm>
+                  <a:off x="3103815" y="3521349"/>
+                  <a:ext cx="415947" cy="369332"/>
+                </a:xfrm>
+                <a:prstGeom prst="rect">
+                  <a:avLst/>
+                </a:prstGeom>
+              </p:spPr>
+              <p:txBody>
+                <a:bodyPr wrap="none">
+                  <a:spAutoFit/>
+                </a:bodyPr>
+                <a:lstStyle/>
+                <a:p>
+                  <a14:m>
+                    <m:oMathPara xmlns:m="http://schemas.openxmlformats.org/officeDocument/2006/math">
+                      <m:oMathParaPr>
+                        <m:jc m:val="centerGroup"/>
+                      </m:oMathParaPr>
+                      <m:oMath xmlns:m="http://schemas.openxmlformats.org/officeDocument/2006/math">
+                        <m:sSub>
+                          <m:sSubPr>
+                            <m:ctrlPr>
+                              <a:rPr lang="en-US" altLang="ko-KR" i="1" smtClean="0">
+                                <a:ln w="0"/>
+                                <a:solidFill>
+                                  <a:schemeClr val="accent1"/>
+                                </a:solidFill>
+                                <a:effectLst>
+                                  <a:outerShdw blurRad="38100" dist="25400" dir="5400000" algn="ctr" rotWithShape="0">
+                                    <a:srgbClr val="6E747A">
+                                      <a:alpha val="43000"/>
+                                    </a:srgbClr>
+                                  </a:outerShdw>
+                                </a:effectLst>
+                                <a:latin typeface="Cambria Math" panose="02040503050406030204" pitchFamily="18" charset="0"/>
+                              </a:rPr>
+                            </m:ctrlPr>
+                          </m:sSubPr>
+                          <m:e>
+                            <m:r>
+                              <a:rPr lang="en-US" altLang="ko-KR" i="1">
+                                <a:ln w="0"/>
+                                <a:solidFill>
+                                  <a:schemeClr val="accent1"/>
+                                </a:solidFill>
+                                <a:effectLst>
+                                  <a:outerShdw blurRad="38100" dist="25400" dir="5400000" algn="ctr" rotWithShape="0">
+                                    <a:srgbClr val="6E747A">
+                                      <a:alpha val="43000"/>
+                                    </a:srgbClr>
+                                  </a:outerShdw>
+                                </a:effectLst>
+                                <a:latin typeface="Cambria Math" panose="02040503050406030204" pitchFamily="18" charset="0"/>
+                              </a:rPr>
+                              <m:t>𝑓</m:t>
+                            </m:r>
+                          </m:e>
+                          <m:sub>
+                            <m:r>
+                              <a:rPr lang="en-US" altLang="ko-KR" i="1">
+                                <a:ln w="0"/>
+                                <a:solidFill>
+                                  <a:schemeClr val="accent1"/>
+                                </a:solidFill>
+                                <a:effectLst>
+                                  <a:outerShdw blurRad="38100" dist="25400" dir="5400000" algn="ctr" rotWithShape="0">
+                                    <a:srgbClr val="6E747A">
+                                      <a:alpha val="43000"/>
+                                    </a:srgbClr>
+                                  </a:outerShdw>
+                                </a:effectLst>
+                                <a:latin typeface="Cambria Math" panose="02040503050406030204" pitchFamily="18" charset="0"/>
+                              </a:rPr>
+                              <m:t>𝑡</m:t>
+                            </m:r>
+                          </m:sub>
+                        </m:sSub>
+                      </m:oMath>
+                    </m:oMathPara>
+                  </a14:m>
+                  <a:endParaRPr lang="ko-KR" altLang="en-US" dirty="0">
+                    <a:ln w="0"/>
+                    <a:solidFill>
+                      <a:schemeClr val="accent1"/>
+                    </a:solidFill>
+                    <a:effectLst>
+                      <a:outerShdw blurRad="38100" dist="25400" dir="5400000" algn="ctr" rotWithShape="0">
+                        <a:srgbClr val="6E747A">
+                          <a:alpha val="43000"/>
+                        </a:srgbClr>
+                      </a:outerShdw>
+                    </a:effectLst>
+                  </a:endParaRPr>
+                </a:p>
+              </p:txBody>
+            </p:sp>
+          </mc:Choice>
+          <mc:Fallback>
+            <p:sp>
+              <p:nvSpPr>
+                <p:cNvPr id="3" name="직사각형 2"/>
+                <p:cNvSpPr>
+                  <a:spLocks noRot="1" noChangeAspect="1" noMove="1" noResize="1" noEditPoints="1" noAdjustHandles="1" noChangeArrowheads="1" noChangeShapeType="1" noTextEdit="1"/>
+                </p:cNvSpPr>
+                <p:nvPr/>
+              </p:nvSpPr>
+              <p:spPr>
+                <a:xfrm>
+                  <a:off x="3103815" y="3521349"/>
+                  <a:ext cx="415947" cy="369332"/>
+                </a:xfrm>
+                <a:prstGeom prst="rect">
+                  <a:avLst/>
+                </a:prstGeom>
+                <a:blipFill rotWithShape="0">
+                  <a:blip r:embed="rId6"/>
+                  <a:stretch>
+                    <a:fillRect b="-20000"/>
+                  </a:stretch>
+                </a:blipFill>
+              </p:spPr>
+              <p:txBody>
+                <a:bodyPr/>
+                <a:lstStyle/>
+                <a:p>
+                  <a:r>
+                    <a:rPr lang="ko-KR" altLang="en-US">
+                      <a:noFill/>
+                    </a:rPr>
+                    <a:t> </a:t>
+                  </a:r>
+                </a:p>
+              </p:txBody>
+            </p:sp>
+          </mc:Fallback>
+        </mc:AlternateContent>
+        <mc:AlternateContent xmlns:mc="http://schemas.openxmlformats.org/markup-compatibility/2006">
+          <mc:Choice xmlns:a14="http://schemas.microsoft.com/office/drawing/2010/main" Requires="a14">
+            <p:sp>
+              <p:nvSpPr>
+                <p:cNvPr id="4" name="직사각형 3"/>
+                <p:cNvSpPr/>
+                <p:nvPr/>
+              </p:nvSpPr>
+              <p:spPr>
+                <a:xfrm>
+                  <a:off x="3894941" y="3401410"/>
+                  <a:ext cx="399084" cy="369332"/>
+                </a:xfrm>
+                <a:prstGeom prst="rect">
+                  <a:avLst/>
+                </a:prstGeom>
+              </p:spPr>
+              <p:txBody>
+                <a:bodyPr wrap="none">
+                  <a:spAutoFit/>
+                </a:bodyPr>
+                <a:lstStyle/>
+                <a:p>
+                  <a14:m>
+                    <m:oMathPara xmlns:m="http://schemas.openxmlformats.org/officeDocument/2006/math">
+                      <m:oMathParaPr>
+                        <m:jc m:val="centerGroup"/>
+                      </m:oMathParaPr>
+                      <m:oMath xmlns:m="http://schemas.openxmlformats.org/officeDocument/2006/math">
+                        <m:sSub>
+                          <m:sSubPr>
+                            <m:ctrlPr>
+                              <a:rPr lang="en-US" altLang="ko-KR" i="1" smtClean="0">
+                                <a:ln w="0"/>
+                                <a:solidFill>
+                                  <a:schemeClr val="accent1"/>
+                                </a:solidFill>
+                                <a:effectLst>
+                                  <a:outerShdw blurRad="38100" dist="25400" dir="5400000" algn="ctr" rotWithShape="0">
+                                    <a:srgbClr val="6E747A">
+                                      <a:alpha val="43000"/>
+                                    </a:srgbClr>
+                                  </a:outerShdw>
+                                </a:effectLst>
+                                <a:latin typeface="Cambria Math" panose="02040503050406030204" pitchFamily="18" charset="0"/>
+                              </a:rPr>
+                            </m:ctrlPr>
+                          </m:sSubPr>
+                          <m:e>
+                            <m:r>
+                              <a:rPr lang="en-US" altLang="ko-KR" i="1">
+                                <a:ln w="0"/>
+                                <a:solidFill>
+                                  <a:schemeClr val="accent1"/>
+                                </a:solidFill>
+                                <a:effectLst>
+                                  <a:outerShdw blurRad="38100" dist="25400" dir="5400000" algn="ctr" rotWithShape="0">
+                                    <a:srgbClr val="6E747A">
+                                      <a:alpha val="43000"/>
+                                    </a:srgbClr>
+                                  </a:outerShdw>
+                                </a:effectLst>
+                                <a:latin typeface="Cambria Math" panose="02040503050406030204" pitchFamily="18" charset="0"/>
+                              </a:rPr>
+                              <m:t>𝑖</m:t>
+                            </m:r>
+                          </m:e>
+                          <m:sub>
+                            <m:r>
+                              <a:rPr lang="en-US" altLang="ko-KR" i="1">
+                                <a:ln w="0"/>
+                                <a:solidFill>
+                                  <a:schemeClr val="accent1"/>
+                                </a:solidFill>
+                                <a:effectLst>
+                                  <a:outerShdw blurRad="38100" dist="25400" dir="5400000" algn="ctr" rotWithShape="0">
+                                    <a:srgbClr val="6E747A">
+                                      <a:alpha val="43000"/>
+                                    </a:srgbClr>
+                                  </a:outerShdw>
+                                </a:effectLst>
+                                <a:latin typeface="Cambria Math" panose="02040503050406030204" pitchFamily="18" charset="0"/>
+                              </a:rPr>
+                              <m:t>𝑡</m:t>
+                            </m:r>
+                          </m:sub>
+                        </m:sSub>
+                      </m:oMath>
+                    </m:oMathPara>
+                  </a14:m>
+                  <a:endParaRPr lang="ko-KR" altLang="en-US" dirty="0">
+                    <a:ln w="0"/>
+                    <a:solidFill>
+                      <a:schemeClr val="accent1"/>
+                    </a:solidFill>
+                    <a:effectLst>
+                      <a:outerShdw blurRad="38100" dist="25400" dir="5400000" algn="ctr" rotWithShape="0">
+                        <a:srgbClr val="6E747A">
+                          <a:alpha val="43000"/>
+                        </a:srgbClr>
+                      </a:outerShdw>
+                    </a:effectLst>
+                  </a:endParaRPr>
+                </a:p>
+              </p:txBody>
+            </p:sp>
+          </mc:Choice>
+          <mc:Fallback>
+            <p:sp>
+              <p:nvSpPr>
+                <p:cNvPr id="4" name="직사각형 3"/>
+                <p:cNvSpPr>
+                  <a:spLocks noRot="1" noChangeAspect="1" noMove="1" noResize="1" noEditPoints="1" noAdjustHandles="1" noChangeArrowheads="1" noChangeShapeType="1" noTextEdit="1"/>
+                </p:cNvSpPr>
+                <p:nvPr/>
+              </p:nvSpPr>
+              <p:spPr>
+                <a:xfrm>
+                  <a:off x="3894941" y="3401410"/>
+                  <a:ext cx="399084" cy="369332"/>
+                </a:xfrm>
+                <a:prstGeom prst="rect">
+                  <a:avLst/>
+                </a:prstGeom>
+                <a:blipFill rotWithShape="0">
+                  <a:blip r:embed="rId7"/>
+                  <a:stretch>
+                    <a:fillRect b="-4918"/>
+                  </a:stretch>
+                </a:blipFill>
+              </p:spPr>
+              <p:txBody>
+                <a:bodyPr/>
+                <a:lstStyle/>
+                <a:p>
+                  <a:r>
+                    <a:rPr lang="ko-KR" altLang="en-US">
+                      <a:noFill/>
+                    </a:rPr>
+                    <a:t> </a:t>
+                  </a:r>
+                </a:p>
+              </p:txBody>
+            </p:sp>
+          </mc:Fallback>
+        </mc:AlternateContent>
+        <mc:AlternateContent xmlns:mc="http://schemas.openxmlformats.org/markup-compatibility/2006">
+          <mc:Choice xmlns:a14="http://schemas.microsoft.com/office/drawing/2010/main" Requires="a14">
+            <p:sp>
+              <p:nvSpPr>
+                <p:cNvPr id="5" name="직사각형 4"/>
+                <p:cNvSpPr/>
+                <p:nvPr/>
+              </p:nvSpPr>
+              <p:spPr>
+                <a:xfrm>
+                  <a:off x="3952245" y="3741214"/>
+                  <a:ext cx="759760" cy="369332"/>
+                </a:xfrm>
+                <a:prstGeom prst="rect">
+                  <a:avLst/>
+                </a:prstGeom>
+              </p:spPr>
+              <p:txBody>
+                <a:bodyPr wrap="none">
+                  <a:spAutoFit/>
+                </a:bodyPr>
+                <a:lstStyle/>
+                <a:p>
+                  <a14:m>
+                    <m:oMathPara xmlns:m="http://schemas.openxmlformats.org/officeDocument/2006/math">
+                      <m:oMathParaPr>
+                        <m:jc m:val="centerGroup"/>
+                      </m:oMathParaPr>
+                      <m:oMath xmlns:m="http://schemas.openxmlformats.org/officeDocument/2006/math">
+                        <m:sSub>
+                          <m:sSubPr>
+                            <m:ctrlPr>
+                              <a:rPr lang="en-US" altLang="ko-KR" i="1" smtClean="0">
+                                <a:ln w="0"/>
+                                <a:solidFill>
+                                  <a:schemeClr val="accent1"/>
+                                </a:solidFill>
+                                <a:effectLst>
+                                  <a:outerShdw blurRad="38100" dist="25400" dir="5400000" algn="ctr" rotWithShape="0">
+                                    <a:srgbClr val="6E747A">
+                                      <a:alpha val="43000"/>
+                                    </a:srgbClr>
+                                  </a:outerShdw>
+                                </a:effectLst>
+                                <a:latin typeface="Cambria Math" panose="02040503050406030204" pitchFamily="18" charset="0"/>
+                              </a:rPr>
+                            </m:ctrlPr>
+                          </m:sSubPr>
+                          <m:e>
+                            <m:r>
+                              <a:rPr lang="en-US" altLang="ko-KR" i="1">
+                                <a:ln w="0"/>
+                                <a:solidFill>
+                                  <a:schemeClr val="accent1"/>
+                                </a:solidFill>
+                                <a:effectLst>
+                                  <a:outerShdw blurRad="38100" dist="25400" dir="5400000" algn="ctr" rotWithShape="0">
+                                    <a:srgbClr val="6E747A">
+                                      <a:alpha val="43000"/>
+                                    </a:srgbClr>
+                                  </a:outerShdw>
+                                </a:effectLst>
+                                <a:latin typeface="Cambria Math" panose="02040503050406030204" pitchFamily="18" charset="0"/>
+                              </a:rPr>
+                              <m:t>𝑐</m:t>
+                            </m:r>
+                          </m:e>
+                          <m:sub>
+                            <m:r>
+                              <a:rPr lang="en-US" altLang="ko-KR" i="1">
+                                <a:ln w="0"/>
+                                <a:solidFill>
+                                  <a:schemeClr val="accent1"/>
+                                </a:solidFill>
+                                <a:effectLst>
+                                  <a:outerShdw blurRad="38100" dist="25400" dir="5400000" algn="ctr" rotWithShape="0">
+                                    <a:srgbClr val="6E747A">
+                                      <a:alpha val="43000"/>
+                                    </a:srgbClr>
+                                  </a:outerShdw>
+                                </a:effectLst>
+                                <a:latin typeface="Cambria Math" panose="02040503050406030204" pitchFamily="18" charset="0"/>
+                              </a:rPr>
+                              <m:t>𝑐𝑎𝑛𝑑</m:t>
+                            </m:r>
+                          </m:sub>
+                        </m:sSub>
+                      </m:oMath>
+                    </m:oMathPara>
+                  </a14:m>
+                  <a:endParaRPr lang="ko-KR" altLang="en-US" dirty="0">
+                    <a:ln w="0"/>
+                    <a:solidFill>
+                      <a:schemeClr val="accent1"/>
+                    </a:solidFill>
+                    <a:effectLst>
+                      <a:outerShdw blurRad="38100" dist="25400" dir="5400000" algn="ctr" rotWithShape="0">
+                        <a:srgbClr val="6E747A">
+                          <a:alpha val="43000"/>
+                        </a:srgbClr>
+                      </a:outerShdw>
+                    </a:effectLst>
+                  </a:endParaRPr>
+                </a:p>
+              </p:txBody>
+            </p:sp>
+          </mc:Choice>
+          <mc:Fallback>
+            <p:sp>
+              <p:nvSpPr>
+                <p:cNvPr id="5" name="직사각형 4"/>
+                <p:cNvSpPr>
+                  <a:spLocks noRot="1" noChangeAspect="1" noMove="1" noResize="1" noEditPoints="1" noAdjustHandles="1" noChangeArrowheads="1" noChangeShapeType="1" noTextEdit="1"/>
+                </p:cNvSpPr>
+                <p:nvPr/>
+              </p:nvSpPr>
+              <p:spPr>
+                <a:xfrm>
+                  <a:off x="3952245" y="3741214"/>
+                  <a:ext cx="759760" cy="369332"/>
+                </a:xfrm>
+                <a:prstGeom prst="rect">
+                  <a:avLst/>
+                </a:prstGeom>
+                <a:blipFill rotWithShape="0">
+                  <a:blip r:embed="rId8"/>
+                  <a:stretch>
+                    <a:fillRect b="-6667"/>
+                  </a:stretch>
+                </a:blipFill>
+              </p:spPr>
+              <p:txBody>
+                <a:bodyPr/>
+                <a:lstStyle/>
+                <a:p>
+                  <a:r>
+                    <a:rPr lang="ko-KR" altLang="en-US">
+                      <a:noFill/>
+                    </a:rPr>
+                    <a:t> </a:t>
+                  </a:r>
+                </a:p>
+              </p:txBody>
+            </p:sp>
+          </mc:Fallback>
+        </mc:AlternateContent>
+        <mc:AlternateContent xmlns:mc="http://schemas.openxmlformats.org/markup-compatibility/2006">
+          <mc:Choice xmlns:a14="http://schemas.microsoft.com/office/drawing/2010/main" Requires="a14">
+            <p:sp>
+              <p:nvSpPr>
+                <p:cNvPr id="9" name="직사각형 8"/>
+                <p:cNvSpPr/>
+                <p:nvPr/>
+              </p:nvSpPr>
+              <p:spPr>
+                <a:xfrm>
+                  <a:off x="5292081" y="4359119"/>
+                  <a:ext cx="453586" cy="369332"/>
+                </a:xfrm>
+                <a:prstGeom prst="rect">
+                  <a:avLst/>
+                </a:prstGeom>
+              </p:spPr>
+              <p:txBody>
+                <a:bodyPr wrap="none">
+                  <a:spAutoFit/>
+                </a:bodyPr>
+                <a:lstStyle/>
+                <a:p>
+                  <a14:m>
+                    <m:oMathPara xmlns:m="http://schemas.openxmlformats.org/officeDocument/2006/math">
+                      <m:oMathParaPr>
+                        <m:jc m:val="centerGroup"/>
+                      </m:oMathParaPr>
+                      <m:oMath xmlns:m="http://schemas.openxmlformats.org/officeDocument/2006/math">
+                        <m:sSub>
+                          <m:sSubPr>
+                            <m:ctrlPr>
+                              <a:rPr lang="en-US" altLang="ko-KR" i="1" smtClean="0">
+                                <a:ln w="0"/>
+                                <a:solidFill>
+                                  <a:schemeClr val="accent1"/>
+                                </a:solidFill>
+                                <a:effectLst>
+                                  <a:outerShdw blurRad="38100" dist="25400" dir="5400000" algn="ctr" rotWithShape="0">
+                                    <a:srgbClr val="6E747A">
+                                      <a:alpha val="43000"/>
+                                    </a:srgbClr>
+                                  </a:outerShdw>
+                                </a:effectLst>
+                                <a:latin typeface="Cambria Math" panose="02040503050406030204" pitchFamily="18" charset="0"/>
+                              </a:rPr>
+                            </m:ctrlPr>
+                          </m:sSubPr>
+                          <m:e>
+                            <m:r>
+                              <a:rPr lang="en-US" altLang="ko-KR" i="1">
+                                <a:ln w="0"/>
+                                <a:solidFill>
+                                  <a:schemeClr val="accent1"/>
+                                </a:solidFill>
+                                <a:effectLst>
+                                  <a:outerShdw blurRad="38100" dist="25400" dir="5400000" algn="ctr" rotWithShape="0">
+                                    <a:srgbClr val="6E747A">
+                                      <a:alpha val="43000"/>
+                                    </a:srgbClr>
+                                  </a:outerShdw>
+                                </a:effectLst>
+                                <a:latin typeface="Cambria Math" panose="02040503050406030204" pitchFamily="18" charset="0"/>
+                              </a:rPr>
+                              <m:t>h</m:t>
+                            </m:r>
+                          </m:e>
+                          <m:sub>
+                            <m:r>
+                              <a:rPr lang="en-US" altLang="ko-KR" i="1">
+                                <a:ln w="0"/>
+                                <a:solidFill>
+                                  <a:schemeClr val="accent1"/>
+                                </a:solidFill>
+                                <a:effectLst>
+                                  <a:outerShdw blurRad="38100" dist="25400" dir="5400000" algn="ctr" rotWithShape="0">
+                                    <a:srgbClr val="6E747A">
+                                      <a:alpha val="43000"/>
+                                    </a:srgbClr>
+                                  </a:outerShdw>
+                                </a:effectLst>
+                                <a:latin typeface="Cambria Math" panose="02040503050406030204" pitchFamily="18" charset="0"/>
+                              </a:rPr>
+                              <m:t>𝑡</m:t>
+                            </m:r>
+                          </m:sub>
+                        </m:sSub>
+                      </m:oMath>
+                    </m:oMathPara>
+                  </a14:m>
+                  <a:endParaRPr lang="ko-KR" altLang="en-US" dirty="0">
+                    <a:ln w="0"/>
+                    <a:solidFill>
+                      <a:schemeClr val="accent1"/>
+                    </a:solidFill>
+                    <a:effectLst>
+                      <a:outerShdw blurRad="38100" dist="25400" dir="5400000" algn="ctr" rotWithShape="0">
+                        <a:srgbClr val="6E747A">
+                          <a:alpha val="43000"/>
+                        </a:srgbClr>
+                      </a:outerShdw>
+                    </a:effectLst>
+                  </a:endParaRPr>
+                </a:p>
+              </p:txBody>
+            </p:sp>
+          </mc:Choice>
+          <mc:Fallback>
+            <p:sp>
+              <p:nvSpPr>
+                <p:cNvPr id="9" name="직사각형 8"/>
+                <p:cNvSpPr>
+                  <a:spLocks noRot="1" noChangeAspect="1" noMove="1" noResize="1" noEditPoints="1" noAdjustHandles="1" noChangeArrowheads="1" noChangeShapeType="1" noTextEdit="1"/>
+                </p:cNvSpPr>
+                <p:nvPr/>
+              </p:nvSpPr>
+              <p:spPr>
+                <a:xfrm>
+                  <a:off x="5292081" y="4359119"/>
+                  <a:ext cx="453586" cy="369332"/>
+                </a:xfrm>
+                <a:prstGeom prst="rect">
+                  <a:avLst/>
+                </a:prstGeom>
+                <a:blipFill rotWithShape="0">
+                  <a:blip r:embed="rId9"/>
+                  <a:stretch>
+                    <a:fillRect b="-4918"/>
+                  </a:stretch>
+                </a:blipFill>
+              </p:spPr>
+              <p:txBody>
+                <a:bodyPr/>
+                <a:lstStyle/>
+                <a:p>
+                  <a:r>
+                    <a:rPr lang="ko-KR" altLang="en-US">
+                      <a:noFill/>
+                    </a:rPr>
+                    <a:t> </a:t>
+                  </a:r>
+                </a:p>
+              </p:txBody>
+            </p:sp>
+          </mc:Fallback>
+        </mc:AlternateContent>
+        <p:sp>
+          <p:nvSpPr>
+            <p:cNvPr id="10" name="직사각형 9"/>
+            <p:cNvSpPr/>
+            <p:nvPr/>
+          </p:nvSpPr>
+          <p:spPr>
+            <a:xfrm>
+              <a:off x="3703061" y="3017314"/>
+              <a:ext cx="1181927" cy="369332"/>
+            </a:xfrm>
+            <a:prstGeom prst="rect">
+              <a:avLst/>
+            </a:prstGeom>
+          </p:spPr>
+          <p:txBody>
+            <a:bodyPr wrap="none">
+              <a:spAutoFit/>
+            </a:bodyPr>
+            <a:lstStyle/>
+            <a:p>
+              <a:r>
+                <a:rPr lang="en-US" altLang="ko-KR" dirty="0">
+                  <a:ln w="0"/>
+                  <a:solidFill>
+                    <a:schemeClr val="accent1"/>
+                  </a:solidFill>
+                  <a:effectLst>
+                    <a:outerShdw blurRad="38100" dist="25400" dir="5400000" algn="ctr" rotWithShape="0">
+                      <a:srgbClr val="6E747A">
+                        <a:alpha val="43000"/>
+                      </a:srgbClr>
+                    </a:outerShdw>
+                  </a:effectLst>
+                </a:rPr>
+                <a:t>Input Gate</a:t>
+              </a:r>
+              <a:endParaRPr lang="ko-KR" altLang="en-US" dirty="0">
+                <a:ln w="0"/>
                 <a:solidFill>
-                  <a:srgbClr val="FFFFFF"/>
+                  <a:schemeClr val="accent1"/>
                 </a:solidFill>
-              </a14:hiddenFill>
-            </a:ext>
-          </a:extLst>
-        </p:spPr>
-      </p:pic>
-      <mc:AlternateContent xmlns:mc="http://schemas.openxmlformats.org/markup-compatibility/2006">
-        <mc:Choice xmlns:a14="http://schemas.microsoft.com/office/drawing/2010/main" Requires="a14">
-          <p:sp>
-            <p:nvSpPr>
-              <p:cNvPr id="2" name="직사각형 1"/>
-              <p:cNvSpPr/>
-              <p:nvPr/>
-            </p:nvSpPr>
-            <p:spPr>
-              <a:xfrm>
-                <a:off x="1691496" y="4130659"/>
-                <a:ext cx="1631152" cy="545855"/>
-              </a:xfrm>
-              <a:prstGeom prst="rect">
-                <a:avLst/>
-              </a:prstGeom>
-            </p:spPr>
-            <p:txBody>
-              <a:bodyPr wrap="none">
-                <a:spAutoFit/>
-              </a:bodyPr>
-              <a:lstStyle/>
-              <a:p>
-                <a14:m>
-                  <m:oMathPara xmlns:m="http://schemas.openxmlformats.org/officeDocument/2006/math">
-                    <m:oMathParaPr>
-                      <m:jc m:val="centerGroup"/>
-                    </m:oMathParaPr>
-                    <m:oMath xmlns:m="http://schemas.openxmlformats.org/officeDocument/2006/math">
-                      <m:sSubSup>
-                        <m:sSubSupPr>
-                          <m:ctrlPr>
-                            <a:rPr lang="en-US" altLang="ko-KR" sz="1400" i="1">
-                              <a:latin typeface="Cambria Math" panose="02040503050406030204" pitchFamily="18" charset="0"/>
-                            </a:rPr>
-                          </m:ctrlPr>
-                        </m:sSubSupPr>
-                        <m:e>
-                          <m:r>
-                            <a:rPr lang="en-US" altLang="ko-KR" sz="1400" i="1">
-                              <a:latin typeface="Cambria Math" panose="02040503050406030204" pitchFamily="18" charset="0"/>
-                            </a:rPr>
-                            <m:t>h</m:t>
-                          </m:r>
-                        </m:e>
-                        <m:sub>
-                          <m:r>
-                            <a:rPr lang="en-US" altLang="ko-KR" sz="1400" i="1">
-                              <a:latin typeface="Cambria Math" panose="02040503050406030204" pitchFamily="18" charset="0"/>
-                            </a:rPr>
-                            <m:t>𝑡</m:t>
-                          </m:r>
-                          <m:r>
-                            <a:rPr lang="en-US" altLang="ko-KR" sz="1400" i="1">
-                              <a:latin typeface="Cambria Math" panose="02040503050406030204" pitchFamily="18" charset="0"/>
-                            </a:rPr>
-                            <m:t>−1</m:t>
-                          </m:r>
-                        </m:sub>
-                        <m:sup/>
-                      </m:sSubSup>
-                    </m:oMath>
-                  </m:oMathPara>
-                </a14:m>
-                <a:endParaRPr lang="en-US" altLang="ko-KR" sz="1400" dirty="0" smtClean="0"/>
-              </a:p>
-              <a:p>
-                <a:r>
-                  <a:rPr lang="en-US" altLang="ko-KR" sz="1400" dirty="0" smtClean="0"/>
-                  <a:t>short-term memory</a:t>
-                </a:r>
-                <a:endParaRPr lang="ko-KR" altLang="en-US" dirty="0"/>
-              </a:p>
-            </p:txBody>
-          </p:sp>
-        </mc:Choice>
-        <mc:Fallback>
-          <p:sp>
-            <p:nvSpPr>
-              <p:cNvPr id="2" name="직사각형 1"/>
-              <p:cNvSpPr>
-                <a:spLocks noRot="1" noChangeAspect="1" noMove="1" noResize="1" noEditPoints="1" noAdjustHandles="1" noChangeArrowheads="1" noChangeShapeType="1" noTextEdit="1"/>
-              </p:cNvSpPr>
-              <p:nvPr/>
-            </p:nvSpPr>
-            <p:spPr>
-              <a:xfrm>
-                <a:off x="1691496" y="4130659"/>
-                <a:ext cx="1631152" cy="545855"/>
-              </a:xfrm>
-              <a:prstGeom prst="rect">
-                <a:avLst/>
-              </a:prstGeom>
-              <a:blipFill rotWithShape="0">
-                <a:blip r:embed="rId4"/>
-                <a:stretch>
-                  <a:fillRect l="-1119" b="-11236"/>
-                </a:stretch>
-              </a:blipFill>
-            </p:spPr>
-            <p:txBody>
-              <a:bodyPr/>
-              <a:lstStyle/>
-              <a:p>
-                <a:r>
-                  <a:rPr lang="ko-KR" altLang="en-US">
-                    <a:noFill/>
-                  </a:rPr>
-                  <a:t> </a:t>
-                </a:r>
-              </a:p>
-            </p:txBody>
-          </p:sp>
-        </mc:Fallback>
-      </mc:AlternateContent>
-      <mc:AlternateContent xmlns:mc="http://schemas.openxmlformats.org/markup-compatibility/2006">
-        <mc:Choice xmlns:a14="http://schemas.microsoft.com/office/drawing/2010/main" Requires="a14">
-          <p:sp>
-            <p:nvSpPr>
-              <p:cNvPr id="8" name="직사각형 7"/>
-              <p:cNvSpPr/>
-              <p:nvPr/>
-            </p:nvSpPr>
-            <p:spPr>
-              <a:xfrm>
-                <a:off x="1749297" y="3070548"/>
-                <a:ext cx="1563826" cy="523220"/>
-              </a:xfrm>
-              <a:prstGeom prst="rect">
-                <a:avLst/>
-              </a:prstGeom>
-            </p:spPr>
-            <p:txBody>
-              <a:bodyPr wrap="none">
-                <a:spAutoFit/>
-              </a:bodyPr>
-              <a:lstStyle/>
-              <a:p>
-                <a:r>
-                  <a:rPr lang="en-US" altLang="ko-KR" sz="1400" dirty="0"/>
-                  <a:t>long-term </a:t>
-                </a:r>
-                <a:r>
-                  <a:rPr lang="en-US" altLang="ko-KR" sz="1400" dirty="0" smtClean="0"/>
-                  <a:t>memory</a:t>
-                </a:r>
-                <a:endParaRPr lang="en-US" altLang="ko-KR" sz="1400" i="1" dirty="0" smtClean="0">
-                  <a:latin typeface="Cambria Math" panose="02040503050406030204" pitchFamily="18" charset="0"/>
-                </a:endParaRPr>
-              </a:p>
-              <a:p>
-                <a14:m>
-                  <m:oMathPara xmlns:m="http://schemas.openxmlformats.org/officeDocument/2006/math">
-                    <m:oMathParaPr>
-                      <m:jc m:val="centerGroup"/>
-                    </m:oMathParaPr>
-                    <m:oMath xmlns:m="http://schemas.openxmlformats.org/officeDocument/2006/math">
-                      <m:sSub>
-                        <m:sSubPr>
-                          <m:ctrlPr>
-                            <a:rPr lang="en-US" altLang="ko-KR" sz="1400" i="1">
-                              <a:latin typeface="Cambria Math" panose="02040503050406030204" pitchFamily="18" charset="0"/>
-                            </a:rPr>
-                          </m:ctrlPr>
-                        </m:sSubPr>
-                        <m:e>
-                          <m:r>
-                            <a:rPr lang="en-US" altLang="ko-KR" sz="1400" i="1">
-                              <a:latin typeface="Cambria Math" panose="02040503050406030204" pitchFamily="18" charset="0"/>
-                            </a:rPr>
-                            <m:t>𝑐</m:t>
-                          </m:r>
-                        </m:e>
-                        <m:sub>
-                          <m:r>
-                            <a:rPr lang="en-US" altLang="ko-KR" sz="1400" i="1">
-                              <a:latin typeface="Cambria Math" panose="02040503050406030204" pitchFamily="18" charset="0"/>
-                            </a:rPr>
-                            <m:t>𝑡</m:t>
-                          </m:r>
-                          <m:r>
-                            <a:rPr lang="en-US" altLang="ko-KR" sz="1400" i="1">
-                              <a:latin typeface="Cambria Math" panose="02040503050406030204" pitchFamily="18" charset="0"/>
-                            </a:rPr>
-                            <m:t>−1</m:t>
-                          </m:r>
-                        </m:sub>
-                      </m:sSub>
-                    </m:oMath>
-                  </m:oMathPara>
-                </a14:m>
-                <a:endParaRPr lang="en-US" altLang="ko-KR" sz="1400" dirty="0" smtClean="0"/>
-              </a:p>
-            </p:txBody>
-          </p:sp>
-        </mc:Choice>
-        <mc:Fallback>
-          <p:sp>
-            <p:nvSpPr>
-              <p:cNvPr id="8" name="직사각형 7"/>
-              <p:cNvSpPr>
-                <a:spLocks noRot="1" noChangeAspect="1" noMove="1" noResize="1" noEditPoints="1" noAdjustHandles="1" noChangeArrowheads="1" noChangeShapeType="1" noTextEdit="1"/>
-              </p:cNvSpPr>
-              <p:nvPr/>
-            </p:nvSpPr>
-            <p:spPr>
-              <a:xfrm>
-                <a:off x="1749297" y="3070548"/>
-                <a:ext cx="1563826" cy="523220"/>
-              </a:xfrm>
-              <a:prstGeom prst="rect">
-                <a:avLst/>
-              </a:prstGeom>
-              <a:blipFill rotWithShape="0">
-                <a:blip r:embed="rId5"/>
-                <a:stretch>
-                  <a:fillRect l="-1172" t="-1163"/>
-                </a:stretch>
-              </a:blipFill>
-            </p:spPr>
-            <p:txBody>
-              <a:bodyPr/>
-              <a:lstStyle/>
-              <a:p>
-                <a:r>
-                  <a:rPr lang="ko-KR" altLang="en-US">
-                    <a:noFill/>
-                  </a:rPr>
-                  <a:t> </a:t>
-                </a:r>
-              </a:p>
-            </p:txBody>
-          </p:sp>
-        </mc:Fallback>
-      </mc:AlternateContent>
-      <mc:AlternateContent xmlns:mc="http://schemas.openxmlformats.org/markup-compatibility/2006">
-        <mc:Choice xmlns:a14="http://schemas.microsoft.com/office/drawing/2010/main" Requires="a14">
-          <p:sp>
-            <p:nvSpPr>
-              <p:cNvPr id="3" name="직사각형 2"/>
-              <p:cNvSpPr/>
-              <p:nvPr/>
-            </p:nvSpPr>
-            <p:spPr>
-              <a:xfrm>
-                <a:off x="3103815" y="3521349"/>
-                <a:ext cx="415947" cy="369332"/>
-              </a:xfrm>
-              <a:prstGeom prst="rect">
-                <a:avLst/>
-              </a:prstGeom>
-            </p:spPr>
-            <p:txBody>
-              <a:bodyPr wrap="none">
-                <a:spAutoFit/>
-              </a:bodyPr>
-              <a:lstStyle/>
-              <a:p>
-                <a14:m>
-                  <m:oMathPara xmlns:m="http://schemas.openxmlformats.org/officeDocument/2006/math">
-                    <m:oMathParaPr>
-                      <m:jc m:val="centerGroup"/>
-                    </m:oMathParaPr>
-                    <m:oMath xmlns:m="http://schemas.openxmlformats.org/officeDocument/2006/math">
-                      <m:sSub>
-                        <m:sSubPr>
-                          <m:ctrlPr>
-                            <a:rPr lang="en-US" altLang="ko-KR" i="1">
-                              <a:latin typeface="Cambria Math" panose="02040503050406030204" pitchFamily="18" charset="0"/>
-                            </a:rPr>
-                          </m:ctrlPr>
-                        </m:sSubPr>
-                        <m:e>
-                          <m:r>
-                            <a:rPr lang="en-US" altLang="ko-KR" i="1">
-                              <a:latin typeface="Cambria Math" panose="02040503050406030204" pitchFamily="18" charset="0"/>
-                            </a:rPr>
-                            <m:t>𝑓</m:t>
-                          </m:r>
-                        </m:e>
-                        <m:sub>
-                          <m:r>
-                            <a:rPr lang="en-US" altLang="ko-KR" i="1">
-                              <a:latin typeface="Cambria Math" panose="02040503050406030204" pitchFamily="18" charset="0"/>
-                            </a:rPr>
-                            <m:t>𝑡</m:t>
-                          </m:r>
-                        </m:sub>
-                      </m:sSub>
-                    </m:oMath>
-                  </m:oMathPara>
-                </a14:m>
-                <a:endParaRPr lang="ko-KR" altLang="en-US" dirty="0"/>
-              </a:p>
-            </p:txBody>
-          </p:sp>
-        </mc:Choice>
-        <mc:Fallback>
-          <p:sp>
-            <p:nvSpPr>
-              <p:cNvPr id="3" name="직사각형 2"/>
-              <p:cNvSpPr>
-                <a:spLocks noRot="1" noChangeAspect="1" noMove="1" noResize="1" noEditPoints="1" noAdjustHandles="1" noChangeArrowheads="1" noChangeShapeType="1" noTextEdit="1"/>
-              </p:cNvSpPr>
-              <p:nvPr/>
-            </p:nvSpPr>
-            <p:spPr>
-              <a:xfrm>
-                <a:off x="3103815" y="3521349"/>
-                <a:ext cx="415947" cy="369332"/>
-              </a:xfrm>
-              <a:prstGeom prst="rect">
-                <a:avLst/>
-              </a:prstGeom>
-              <a:blipFill rotWithShape="0">
-                <a:blip r:embed="rId6"/>
-                <a:stretch>
-                  <a:fillRect b="-13333"/>
-                </a:stretch>
-              </a:blipFill>
-            </p:spPr>
-            <p:txBody>
-              <a:bodyPr/>
-              <a:lstStyle/>
-              <a:p>
-                <a:r>
-                  <a:rPr lang="ko-KR" altLang="en-US">
-                    <a:noFill/>
-                  </a:rPr>
-                  <a:t> </a:t>
-                </a:r>
-              </a:p>
-            </p:txBody>
-          </p:sp>
-        </mc:Fallback>
-      </mc:AlternateContent>
-      <mc:AlternateContent xmlns:mc="http://schemas.openxmlformats.org/markup-compatibility/2006">
-        <mc:Choice xmlns:a14="http://schemas.microsoft.com/office/drawing/2010/main" Requires="a14">
-          <p:sp>
-            <p:nvSpPr>
-              <p:cNvPr id="4" name="직사각형 3"/>
-              <p:cNvSpPr/>
-              <p:nvPr/>
-            </p:nvSpPr>
-            <p:spPr>
-              <a:xfrm>
-                <a:off x="3894941" y="3401410"/>
-                <a:ext cx="399084" cy="369332"/>
-              </a:xfrm>
-              <a:prstGeom prst="rect">
-                <a:avLst/>
-              </a:prstGeom>
-            </p:spPr>
-            <p:txBody>
-              <a:bodyPr wrap="none">
-                <a:spAutoFit/>
-              </a:bodyPr>
-              <a:lstStyle/>
-              <a:p>
-                <a14:m>
-                  <m:oMathPara xmlns:m="http://schemas.openxmlformats.org/officeDocument/2006/math">
-                    <m:oMathParaPr>
-                      <m:jc m:val="centerGroup"/>
-                    </m:oMathParaPr>
-                    <m:oMath xmlns:m="http://schemas.openxmlformats.org/officeDocument/2006/math">
-                      <m:sSub>
-                        <m:sSubPr>
-                          <m:ctrlPr>
-                            <a:rPr lang="en-US" altLang="ko-KR" i="1">
-                              <a:latin typeface="Cambria Math" panose="02040503050406030204" pitchFamily="18" charset="0"/>
-                            </a:rPr>
-                          </m:ctrlPr>
-                        </m:sSubPr>
-                        <m:e>
-                          <m:r>
-                            <a:rPr lang="en-US" altLang="ko-KR" i="1">
-                              <a:latin typeface="Cambria Math" panose="02040503050406030204" pitchFamily="18" charset="0"/>
-                            </a:rPr>
-                            <m:t>𝑖</m:t>
-                          </m:r>
-                        </m:e>
-                        <m:sub>
-                          <m:r>
-                            <a:rPr lang="en-US" altLang="ko-KR" i="1">
-                              <a:latin typeface="Cambria Math" panose="02040503050406030204" pitchFamily="18" charset="0"/>
-                            </a:rPr>
-                            <m:t>𝑡</m:t>
-                          </m:r>
-                        </m:sub>
-                      </m:sSub>
-                    </m:oMath>
-                  </m:oMathPara>
-                </a14:m>
-                <a:endParaRPr lang="ko-KR" altLang="en-US" dirty="0"/>
-              </a:p>
-            </p:txBody>
-          </p:sp>
-        </mc:Choice>
-        <mc:Fallback>
-          <p:sp>
-            <p:nvSpPr>
-              <p:cNvPr id="4" name="직사각형 3"/>
-              <p:cNvSpPr>
-                <a:spLocks noRot="1" noChangeAspect="1" noMove="1" noResize="1" noEditPoints="1" noAdjustHandles="1" noChangeArrowheads="1" noChangeShapeType="1" noTextEdit="1"/>
-              </p:cNvSpPr>
-              <p:nvPr/>
-            </p:nvSpPr>
-            <p:spPr>
-              <a:xfrm>
-                <a:off x="3894941" y="3401410"/>
-                <a:ext cx="399084" cy="369332"/>
-              </a:xfrm>
-              <a:prstGeom prst="rect">
-                <a:avLst/>
-              </a:prstGeom>
-              <a:blipFill rotWithShape="0">
-                <a:blip r:embed="rId7"/>
-                <a:stretch>
-                  <a:fillRect/>
-                </a:stretch>
-              </a:blipFill>
-            </p:spPr>
-            <p:txBody>
-              <a:bodyPr/>
-              <a:lstStyle/>
-              <a:p>
-                <a:r>
-                  <a:rPr lang="ko-KR" altLang="en-US">
-                    <a:noFill/>
-                  </a:rPr>
-                  <a:t> </a:t>
-                </a:r>
-              </a:p>
-            </p:txBody>
-          </p:sp>
-        </mc:Fallback>
-      </mc:AlternateContent>
-      <mc:AlternateContent xmlns:mc="http://schemas.openxmlformats.org/markup-compatibility/2006">
-        <mc:Choice xmlns:a14="http://schemas.microsoft.com/office/drawing/2010/main" Requires="a14">
-          <p:sp>
-            <p:nvSpPr>
-              <p:cNvPr id="5" name="직사각형 4"/>
-              <p:cNvSpPr/>
-              <p:nvPr/>
-            </p:nvSpPr>
-            <p:spPr>
-              <a:xfrm>
-                <a:off x="3952245" y="3741214"/>
-                <a:ext cx="759760" cy="369332"/>
-              </a:xfrm>
-              <a:prstGeom prst="rect">
-                <a:avLst/>
-              </a:prstGeom>
-            </p:spPr>
-            <p:txBody>
-              <a:bodyPr wrap="none">
-                <a:spAutoFit/>
-              </a:bodyPr>
-              <a:lstStyle/>
-              <a:p>
-                <a14:m>
-                  <m:oMathPara xmlns:m="http://schemas.openxmlformats.org/officeDocument/2006/math">
-                    <m:oMathParaPr>
-                      <m:jc m:val="centerGroup"/>
-                    </m:oMathParaPr>
-                    <m:oMath xmlns:m="http://schemas.openxmlformats.org/officeDocument/2006/math">
-                      <m:sSub>
-                        <m:sSubPr>
-                          <m:ctrlPr>
-                            <a:rPr lang="en-US" altLang="ko-KR" i="1">
-                              <a:latin typeface="Cambria Math" panose="02040503050406030204" pitchFamily="18" charset="0"/>
-                            </a:rPr>
-                          </m:ctrlPr>
-                        </m:sSubPr>
-                        <m:e>
-                          <m:r>
-                            <a:rPr lang="en-US" altLang="ko-KR" i="1">
-                              <a:latin typeface="Cambria Math" panose="02040503050406030204" pitchFamily="18" charset="0"/>
-                            </a:rPr>
-                            <m:t>𝑐</m:t>
-                          </m:r>
-                        </m:e>
-                        <m:sub>
-                          <m:r>
-                            <a:rPr lang="en-US" altLang="ko-KR" i="1">
-                              <a:latin typeface="Cambria Math" panose="02040503050406030204" pitchFamily="18" charset="0"/>
-                            </a:rPr>
-                            <m:t>𝑐𝑎𝑛𝑑</m:t>
-                          </m:r>
-                        </m:sub>
-                      </m:sSub>
-                    </m:oMath>
-                  </m:oMathPara>
-                </a14:m>
-                <a:endParaRPr lang="ko-KR" altLang="en-US" dirty="0"/>
-              </a:p>
-            </p:txBody>
-          </p:sp>
-        </mc:Choice>
-        <mc:Fallback>
-          <p:sp>
-            <p:nvSpPr>
-              <p:cNvPr id="5" name="직사각형 4"/>
-              <p:cNvSpPr>
-                <a:spLocks noRot="1" noChangeAspect="1" noMove="1" noResize="1" noEditPoints="1" noAdjustHandles="1" noChangeArrowheads="1" noChangeShapeType="1" noTextEdit="1"/>
-              </p:cNvSpPr>
-              <p:nvPr/>
-            </p:nvSpPr>
-            <p:spPr>
-              <a:xfrm>
-                <a:off x="3952245" y="3741214"/>
-                <a:ext cx="759760" cy="369332"/>
-              </a:xfrm>
-              <a:prstGeom prst="rect">
-                <a:avLst/>
-              </a:prstGeom>
-              <a:blipFill rotWithShape="0">
-                <a:blip r:embed="rId8"/>
-                <a:stretch>
-                  <a:fillRect/>
-                </a:stretch>
-              </a:blipFill>
-            </p:spPr>
-            <p:txBody>
-              <a:bodyPr/>
-              <a:lstStyle/>
-              <a:p>
-                <a:r>
-                  <a:rPr lang="ko-KR" altLang="en-US">
-                    <a:noFill/>
-                  </a:rPr>
-                  <a:t> </a:t>
-                </a:r>
-              </a:p>
-            </p:txBody>
-          </p:sp>
-        </mc:Fallback>
-      </mc:AlternateContent>
-      <mc:AlternateContent xmlns:mc="http://schemas.openxmlformats.org/markup-compatibility/2006">
-        <mc:Choice xmlns:a14="http://schemas.microsoft.com/office/drawing/2010/main" Requires="a14">
-          <p:sp>
-            <p:nvSpPr>
-              <p:cNvPr id="9" name="직사각형 8"/>
-              <p:cNvSpPr/>
-              <p:nvPr/>
-            </p:nvSpPr>
-            <p:spPr>
-              <a:xfrm>
-                <a:off x="5292081" y="4359119"/>
-                <a:ext cx="453586" cy="369332"/>
-              </a:xfrm>
-              <a:prstGeom prst="rect">
-                <a:avLst/>
-              </a:prstGeom>
-            </p:spPr>
-            <p:txBody>
-              <a:bodyPr wrap="none">
-                <a:spAutoFit/>
-              </a:bodyPr>
-              <a:lstStyle/>
-              <a:p>
-                <a14:m>
-                  <m:oMathPara xmlns:m="http://schemas.openxmlformats.org/officeDocument/2006/math">
-                    <m:oMathParaPr>
-                      <m:jc m:val="centerGroup"/>
-                    </m:oMathParaPr>
-                    <m:oMath xmlns:m="http://schemas.openxmlformats.org/officeDocument/2006/math">
-                      <m:sSub>
-                        <m:sSubPr>
-                          <m:ctrlPr>
-                            <a:rPr lang="en-US" altLang="ko-KR" i="1">
-                              <a:latin typeface="Cambria Math" panose="02040503050406030204" pitchFamily="18" charset="0"/>
-                            </a:rPr>
-                          </m:ctrlPr>
-                        </m:sSubPr>
-                        <m:e>
-                          <m:r>
-                            <a:rPr lang="en-US" altLang="ko-KR" i="1">
-                              <a:latin typeface="Cambria Math" panose="02040503050406030204" pitchFamily="18" charset="0"/>
-                            </a:rPr>
-                            <m:t>h</m:t>
-                          </m:r>
-                        </m:e>
-                        <m:sub>
-                          <m:r>
-                            <a:rPr lang="en-US" altLang="ko-KR" i="1">
-                              <a:latin typeface="Cambria Math" panose="02040503050406030204" pitchFamily="18" charset="0"/>
-                            </a:rPr>
-                            <m:t>𝑡</m:t>
-                          </m:r>
-                        </m:sub>
-                      </m:sSub>
-                    </m:oMath>
-                  </m:oMathPara>
-                </a14:m>
-                <a:endParaRPr lang="ko-KR" altLang="en-US" dirty="0"/>
-              </a:p>
-            </p:txBody>
-          </p:sp>
-        </mc:Choice>
-        <mc:Fallback>
-          <p:sp>
-            <p:nvSpPr>
-              <p:cNvPr id="9" name="직사각형 8"/>
-              <p:cNvSpPr>
-                <a:spLocks noRot="1" noChangeAspect="1" noMove="1" noResize="1" noEditPoints="1" noAdjustHandles="1" noChangeArrowheads="1" noChangeShapeType="1" noTextEdit="1"/>
-              </p:cNvSpPr>
-              <p:nvPr/>
-            </p:nvSpPr>
-            <p:spPr>
-              <a:xfrm>
-                <a:off x="5292081" y="4359119"/>
-                <a:ext cx="453586" cy="369332"/>
-              </a:xfrm>
-              <a:prstGeom prst="rect">
-                <a:avLst/>
-              </a:prstGeom>
-              <a:blipFill rotWithShape="0">
-                <a:blip r:embed="rId9"/>
-                <a:stretch>
-                  <a:fillRect/>
-                </a:stretch>
-              </a:blipFill>
-            </p:spPr>
-            <p:txBody>
-              <a:bodyPr/>
-              <a:lstStyle/>
-              <a:p>
-                <a:r>
-                  <a:rPr lang="ko-KR" altLang="en-US">
-                    <a:noFill/>
-                  </a:rPr>
-                  <a:t> </a:t>
-                </a:r>
-              </a:p>
-            </p:txBody>
-          </p:sp>
-        </mc:Fallback>
-      </mc:AlternateContent>
-      <p:sp>
-        <p:nvSpPr>
-          <p:cNvPr id="10" name="직사각형 9"/>
-          <p:cNvSpPr/>
-          <p:nvPr/>
-        </p:nvSpPr>
-        <p:spPr>
-          <a:xfrm>
-            <a:off x="3703061" y="3017314"/>
-            <a:ext cx="1181927" cy="369332"/>
-          </a:xfrm>
-          <a:prstGeom prst="rect">
-            <a:avLst/>
-          </a:prstGeom>
-        </p:spPr>
-        <p:txBody>
-          <a:bodyPr wrap="none">
-            <a:spAutoFit/>
-          </a:bodyPr>
-          <a:lstStyle/>
-          <a:p>
-            <a:r>
-              <a:rPr lang="en-US" altLang="ko-KR" dirty="0"/>
-              <a:t>Input Gate</a:t>
-            </a:r>
-            <a:endParaRPr lang="ko-KR" altLang="en-US" dirty="0"/>
-          </a:p>
-        </p:txBody>
-      </p:sp>
-      <p:sp>
-        <p:nvSpPr>
-          <p:cNvPr id="12" name="직사각형 11"/>
-          <p:cNvSpPr/>
-          <p:nvPr/>
-        </p:nvSpPr>
-        <p:spPr>
-          <a:xfrm>
-            <a:off x="4782287" y="3911311"/>
-            <a:ext cx="1353447" cy="369332"/>
-          </a:xfrm>
-          <a:prstGeom prst="rect">
-            <a:avLst/>
-          </a:prstGeom>
-        </p:spPr>
-        <p:txBody>
-          <a:bodyPr wrap="none">
-            <a:spAutoFit/>
-          </a:bodyPr>
-          <a:lstStyle/>
-          <a:p>
-            <a:r>
-              <a:rPr lang="en-US" altLang="ko-KR" dirty="0" smtClean="0"/>
-              <a:t>Output </a:t>
-            </a:r>
-            <a:r>
-              <a:rPr lang="en-US" altLang="ko-KR" dirty="0"/>
-              <a:t>Gate</a:t>
-            </a:r>
-            <a:endParaRPr lang="ko-KR" altLang="en-US" dirty="0"/>
-          </a:p>
-        </p:txBody>
-      </p:sp>
+                <a:effectLst>
+                  <a:outerShdw blurRad="38100" dist="25400" dir="5400000" algn="ctr" rotWithShape="0">
+                    <a:srgbClr val="6E747A">
+                      <a:alpha val="43000"/>
+                    </a:srgbClr>
+                  </a:outerShdw>
+                </a:effectLst>
+              </a:endParaRPr>
+            </a:p>
+          </p:txBody>
+        </p:sp>
+        <p:sp>
+          <p:nvSpPr>
+            <p:cNvPr id="12" name="직사각형 11"/>
+            <p:cNvSpPr/>
+            <p:nvPr/>
+          </p:nvSpPr>
+          <p:spPr>
+            <a:xfrm>
+              <a:off x="4782287" y="3911311"/>
+              <a:ext cx="1353447" cy="369332"/>
+            </a:xfrm>
+            <a:prstGeom prst="rect">
+              <a:avLst/>
+            </a:prstGeom>
+          </p:spPr>
+          <p:txBody>
+            <a:bodyPr wrap="none">
+              <a:spAutoFit/>
+            </a:bodyPr>
+            <a:lstStyle/>
+            <a:p>
+              <a:r>
+                <a:rPr lang="en-US" altLang="ko-KR" dirty="0" smtClean="0">
+                  <a:ln w="0"/>
+                  <a:solidFill>
+                    <a:schemeClr val="accent1"/>
+                  </a:solidFill>
+                  <a:effectLst>
+                    <a:outerShdw blurRad="38100" dist="25400" dir="5400000" algn="ctr" rotWithShape="0">
+                      <a:srgbClr val="6E747A">
+                        <a:alpha val="43000"/>
+                      </a:srgbClr>
+                    </a:outerShdw>
+                  </a:effectLst>
+                </a:rPr>
+                <a:t>Output </a:t>
+              </a:r>
+              <a:r>
+                <a:rPr lang="en-US" altLang="ko-KR" dirty="0">
+                  <a:ln w="0"/>
+                  <a:solidFill>
+                    <a:schemeClr val="accent1"/>
+                  </a:solidFill>
+                  <a:effectLst>
+                    <a:outerShdw blurRad="38100" dist="25400" dir="5400000" algn="ctr" rotWithShape="0">
+                      <a:srgbClr val="6E747A">
+                        <a:alpha val="43000"/>
+                      </a:srgbClr>
+                    </a:outerShdw>
+                  </a:effectLst>
+                </a:rPr>
+                <a:t>Gate</a:t>
+              </a:r>
+              <a:endParaRPr lang="ko-KR" altLang="en-US" dirty="0">
+                <a:ln w="0"/>
+                <a:solidFill>
+                  <a:schemeClr val="accent1"/>
+                </a:solidFill>
+                <a:effectLst>
+                  <a:outerShdw blurRad="38100" dist="25400" dir="5400000" algn="ctr" rotWithShape="0">
+                    <a:srgbClr val="6E747A">
+                      <a:alpha val="43000"/>
+                    </a:srgbClr>
+                  </a:outerShdw>
+                </a:effectLst>
+              </a:endParaRPr>
+            </a:p>
+          </p:txBody>
+        </p:sp>
+      </p:grpSp>
     </p:spTree>
     <p:extLst>
       <p:ext uri="{BB962C8B-B14F-4D97-AF65-F5344CB8AC3E}">

</xml_diff>